<commit_message>
this is my second commit
</commit_message>
<xml_diff>
--- a/HybridFrameWork.pptx
+++ b/HybridFrameWork.pptx
@@ -218,7 +218,7 @@
           <a:p>
             <a:fld id="{154464F9-41F4-4DC9-9FE1-42A984816B95}" type="datetimeFigureOut">
               <a:rPr lang="en-US" smtClean="0"/>
-              <a:t>3/13/2022</a:t>
+              <a:t>3/16/2022</a:t>
             </a:fld>
             <a:endParaRPr lang="en-US"/>
           </a:p>
@@ -719,7 +719,7 @@
           <a:p>
             <a:fld id="{4F650E18-0E25-443C-B3EF-D2CCDCCC53A0}" type="datetimeFigureOut">
               <a:rPr lang="en-US" smtClean="0"/>
-              <a:t>3/13/2022</a:t>
+              <a:t>3/16/2022</a:t>
             </a:fld>
             <a:endParaRPr lang="en-US"/>
           </a:p>
@@ -917,7 +917,7 @@
           <a:p>
             <a:fld id="{4F650E18-0E25-443C-B3EF-D2CCDCCC53A0}" type="datetimeFigureOut">
               <a:rPr lang="en-US" smtClean="0"/>
-              <a:t>3/13/2022</a:t>
+              <a:t>3/16/2022</a:t>
             </a:fld>
             <a:endParaRPr lang="en-US"/>
           </a:p>
@@ -1125,7 +1125,7 @@
           <a:p>
             <a:fld id="{4F650E18-0E25-443C-B3EF-D2CCDCCC53A0}" type="datetimeFigureOut">
               <a:rPr lang="en-US" smtClean="0"/>
-              <a:t>3/13/2022</a:t>
+              <a:t>3/16/2022</a:t>
             </a:fld>
             <a:endParaRPr lang="en-US"/>
           </a:p>
@@ -1323,7 +1323,7 @@
           <a:p>
             <a:fld id="{4F650E18-0E25-443C-B3EF-D2CCDCCC53A0}" type="datetimeFigureOut">
               <a:rPr lang="en-US" smtClean="0"/>
-              <a:t>3/13/2022</a:t>
+              <a:t>3/16/2022</a:t>
             </a:fld>
             <a:endParaRPr lang="en-US"/>
           </a:p>
@@ -1598,7 +1598,7 @@
           <a:p>
             <a:fld id="{4F650E18-0E25-443C-B3EF-D2CCDCCC53A0}" type="datetimeFigureOut">
               <a:rPr lang="en-US" smtClean="0"/>
-              <a:t>3/13/2022</a:t>
+              <a:t>3/16/2022</a:t>
             </a:fld>
             <a:endParaRPr lang="en-US"/>
           </a:p>
@@ -1863,7 +1863,7 @@
           <a:p>
             <a:fld id="{4F650E18-0E25-443C-B3EF-D2CCDCCC53A0}" type="datetimeFigureOut">
               <a:rPr lang="en-US" smtClean="0"/>
-              <a:t>3/13/2022</a:t>
+              <a:t>3/16/2022</a:t>
             </a:fld>
             <a:endParaRPr lang="en-US"/>
           </a:p>
@@ -2275,7 +2275,7 @@
           <a:p>
             <a:fld id="{4F650E18-0E25-443C-B3EF-D2CCDCCC53A0}" type="datetimeFigureOut">
               <a:rPr lang="en-US" smtClean="0"/>
-              <a:t>3/13/2022</a:t>
+              <a:t>3/16/2022</a:t>
             </a:fld>
             <a:endParaRPr lang="en-US"/>
           </a:p>
@@ -2416,7 +2416,7 @@
           <a:p>
             <a:fld id="{4F650E18-0E25-443C-B3EF-D2CCDCCC53A0}" type="datetimeFigureOut">
               <a:rPr lang="en-US" smtClean="0"/>
-              <a:t>3/13/2022</a:t>
+              <a:t>3/16/2022</a:t>
             </a:fld>
             <a:endParaRPr lang="en-US"/>
           </a:p>
@@ -2529,7 +2529,7 @@
           <a:p>
             <a:fld id="{4F650E18-0E25-443C-B3EF-D2CCDCCC53A0}" type="datetimeFigureOut">
               <a:rPr lang="en-US" smtClean="0"/>
-              <a:t>3/13/2022</a:t>
+              <a:t>3/16/2022</a:t>
             </a:fld>
             <a:endParaRPr lang="en-US"/>
           </a:p>
@@ -2840,7 +2840,7 @@
           <a:p>
             <a:fld id="{4F650E18-0E25-443C-B3EF-D2CCDCCC53A0}" type="datetimeFigureOut">
               <a:rPr lang="en-US" smtClean="0"/>
-              <a:t>3/13/2022</a:t>
+              <a:t>3/16/2022</a:t>
             </a:fld>
             <a:endParaRPr lang="en-US"/>
           </a:p>
@@ -3128,7 +3128,7 @@
           <a:p>
             <a:fld id="{4F650E18-0E25-443C-B3EF-D2CCDCCC53A0}" type="datetimeFigureOut">
               <a:rPr lang="en-US" smtClean="0"/>
-              <a:t>3/13/2022</a:t>
+              <a:t>3/16/2022</a:t>
             </a:fld>
             <a:endParaRPr lang="en-US"/>
           </a:p>
@@ -3369,7 +3369,7 @@
           <a:p>
             <a:fld id="{4F650E18-0E25-443C-B3EF-D2CCDCCC53A0}" type="datetimeFigureOut">
               <a:rPr lang="en-US" smtClean="0"/>
-              <a:t>3/13/2022</a:t>
+              <a:t>3/16/2022</a:t>
             </a:fld>
             <a:endParaRPr lang="en-US"/>
           </a:p>
@@ -5912,7 +5912,9 @@
         </p:nvSpPr>
         <p:spPr/>
         <p:txBody>
-          <a:bodyPr/>
+          <a:bodyPr>
+            <a:normAutofit lnSpcReduction="10000"/>
+          </a:bodyPr>
           <a:lstStyle/>
           <a:p>
             <a:r>
@@ -5949,9 +5951,63 @@
           </a:p>
           <a:p>
             <a:r>
+              <a:rPr lang="en-US" dirty="0"/>
+              <a:t>Gi</a:t>
+            </a:r>
+          </a:p>
+          <a:p>
+            <a:r>
+              <a:rPr lang="en-US" dirty="0"/>
+              <a:t>git add –A – add all files to the staging area</a:t>
+            </a:r>
+          </a:p>
+          <a:p>
+            <a:r>
+              <a:rPr lang="en-US" dirty="0"/>
+              <a:t>Git config –global user.name “</a:t>
+            </a:r>
+            <a:r>
+              <a:rPr lang="en-US" dirty="0" err="1"/>
+              <a:t>binoyktym</a:t>
+            </a:r>
+            <a:r>
+              <a:rPr lang="en-US" dirty="0"/>
+              <a:t>”</a:t>
+            </a:r>
+          </a:p>
+          <a:p>
+            <a:r>
+              <a:rPr lang="en-US" dirty="0"/>
+              <a:t>Git config –global </a:t>
+            </a:r>
+            <a:r>
+              <a:rPr lang="en-US" dirty="0" err="1"/>
+              <a:t>user.email</a:t>
+            </a:r>
+            <a:r>
+              <a:rPr lang="en-US" dirty="0"/>
+              <a:t> </a:t>
+            </a:r>
+            <a:r>
+              <a:rPr lang="en-US" dirty="0">
+                <a:hlinkClick r:id="rId3"/>
+              </a:rPr>
+              <a:t>ai_ktym@yahoo.com</a:t>
+            </a:r>
+            <a:endParaRPr lang="en-US" dirty="0"/>
+          </a:p>
+          <a:p>
+            <a:r>
+              <a:rPr lang="en-US" dirty="0"/>
+              <a:t>Git commit –m </a:t>
+            </a:r>
+            <a:r>
               <a:rPr lang="en-US"/>
-              <a:t>git add -A</a:t>
-            </a:r>
+              <a:t>“this is my first commit”</a:t>
+            </a:r>
+            <a:endParaRPr lang="en-US" dirty="0"/>
+          </a:p>
+          <a:p>
             <a:endParaRPr lang="en-US" dirty="0"/>
           </a:p>
         </p:txBody>

</xml_diff>